<commit_message>
Update KV6002_21 TOR Presentation.pptx
</commit_message>
<xml_diff>
--- a/KV6002_21 TOR Presentation.pptx
+++ b/KV6002_21 TOR Presentation.pptx
@@ -4158,7 +4158,7 @@
           <a:p>
             <a:r>
               <a:rPr lang="en-GB" dirty="0"/>
-              <a:t>User Story 1</a:t>
+              <a:t>User Story #1</a:t>
             </a:r>
           </a:p>
         </p:txBody>
@@ -4241,7 +4241,7 @@
           <a:p>
             <a:r>
               <a:rPr lang="en-GB" dirty="0"/>
-              <a:t>User Story 2</a:t>
+              <a:t>User Story #2</a:t>
             </a:r>
           </a:p>
         </p:txBody>
@@ -4324,7 +4324,7 @@
           <a:p>
             <a:r>
               <a:rPr lang="en-GB" dirty="0"/>
-              <a:t>User Story 3</a:t>
+              <a:t>User Story #3</a:t>
             </a:r>
           </a:p>
         </p:txBody>
@@ -4407,7 +4407,7 @@
           <a:p>
             <a:r>
               <a:rPr lang="en-GB" dirty="0"/>
-              <a:t>User Story 4</a:t>
+              <a:t>User Story #4</a:t>
             </a:r>
           </a:p>
         </p:txBody>
@@ -4490,7 +4490,7 @@
           <a:p>
             <a:r>
               <a:rPr lang="en-GB"/>
-              <a:t>User Story 5</a:t>
+              <a:t>User Story #5</a:t>
             </a:r>
             <a:endParaRPr lang="en-GB" dirty="0"/>
           </a:p>

</xml_diff>

<commit_message>
ToR - original web client
</commit_message>
<xml_diff>
--- a/KV6002_21 TOR Presentation.pptx
+++ b/KV6002_21 TOR Presentation.pptx
@@ -4574,7 +4574,7 @@
           <a:p>
             <a:r>
               <a:rPr lang="en-GB" dirty="0"/>
-              <a:t>Slide 1</a:t>
+              <a:t>True North Surf Club</a:t>
             </a:r>
           </a:p>
         </p:txBody>
@@ -4597,18 +4597,84 @@
         </p:nvSpPr>
         <p:spPr/>
         <p:txBody>
-          <a:bodyPr/>
-          <a:lstStyle/>
-          <a:p>
-            <a:r>
-              <a:rPr lang="en-GB" dirty="0"/>
-              <a:t>- Information about client.</a:t>
-            </a:r>
-          </a:p>
-          <a:p>
-            <a:r>
-              <a:rPr lang="en-GB" dirty="0"/>
-              <a:t>- Their initial ‘pitch’ (what they want us to develop).</a:t>
+          <a:bodyPr>
+            <a:normAutofit fontScale="92500" lnSpcReduction="20000"/>
+          </a:bodyPr>
+          <a:lstStyle/>
+          <a:p>
+            <a:r>
+              <a:rPr lang="en-GB" dirty="0"/>
+              <a:t>True North Surf Club is an independent Surf Club that is affiliated with Surfing England, and is based in North Tyneside.</a:t>
+            </a:r>
+          </a:p>
+          <a:p>
+            <a:r>
+              <a:rPr lang="en-GB" dirty="0"/>
+              <a:t>They have requested the creation of a website for the surf club, which includes the following features:</a:t>
+            </a:r>
+          </a:p>
+          <a:p>
+            <a:r>
+              <a:rPr lang="en-GB" dirty="0"/>
+              <a:t>- a </a:t>
+            </a:r>
+            <a:r>
+              <a:rPr lang="en-GB" b="1" dirty="0"/>
+              <a:t>gallery page</a:t>
+            </a:r>
+            <a:r>
+              <a:rPr lang="en-GB" dirty="0"/>
+              <a:t> to showcase their images.</a:t>
+            </a:r>
+          </a:p>
+          <a:p>
+            <a:r>
+              <a:rPr lang="en-GB" dirty="0"/>
+              <a:t>- a </a:t>
+            </a:r>
+            <a:r>
+              <a:rPr lang="en-GB" b="1" dirty="0"/>
+              <a:t>contact form </a:t>
+            </a:r>
+            <a:r>
+              <a:rPr lang="en-GB" dirty="0"/>
+              <a:t>to provide a means of contacting the club.</a:t>
+            </a:r>
+          </a:p>
+          <a:p>
+            <a:r>
+              <a:rPr lang="en-GB" dirty="0"/>
+              <a:t>- a </a:t>
+            </a:r>
+            <a:r>
+              <a:rPr lang="en-GB" b="1" dirty="0"/>
+              <a:t>membership sign up page</a:t>
+            </a:r>
+            <a:r>
+              <a:rPr lang="en-GB" dirty="0"/>
+              <a:t>, allowing potential new members to sign up for membership.</a:t>
+            </a:r>
+          </a:p>
+          <a:p>
+            <a:r>
+              <a:rPr lang="en-GB" dirty="0"/>
+              <a:t>- an </a:t>
+            </a:r>
+            <a:r>
+              <a:rPr lang="en-GB" b="1" dirty="0"/>
+              <a:t>e-commerce page </a:t>
+            </a:r>
+            <a:r>
+              <a:rPr lang="en-GB" dirty="0"/>
+              <a:t>so that </a:t>
+            </a:r>
+            <a:r>
+              <a:rPr lang="en-GB"/>
+              <a:t>branded merchandise can </a:t>
+            </a:r>
+            <a:r>
+              <a:rPr lang="en-GB" dirty="0"/>
+              <a:t>be purchased from the club via the website.</a:t>
             </a:r>
           </a:p>
           <a:p>

</xml_diff>